<commit_message>
Add github link to slides
</commit_message>
<xml_diff>
--- a/MC2_Glanz_DataScienceCDSM_Slides.pptx
+++ b/MC2_Glanz_DataScienceCDSM_Slides.pptx
@@ -6135,6 +6135,45 @@
                 </a:solidFill>
               </a:rPr>
               <a:t>And Many More!</a:t>
+            </a:r>
+          </a:p>
+        </p:txBody>
+      </p:sp>
+      <p:sp>
+        <p:nvSpPr>
+          <p:cNvPr id="11" name="TextBox 10">
+            <a:extLst>
+              <a:ext uri="{FF2B5EF4-FFF2-40B4-BE49-F238E27FC236}">
+                <a16:creationId xmlns:a16="http://schemas.microsoft.com/office/drawing/2014/main" id="{315EADEB-716C-4845-913B-8FE1D41E3F0F}"/>
+              </a:ext>
+            </a:extLst>
+          </p:cNvPr>
+          <p:cNvSpPr txBox="1"/>
+          <p:nvPr/>
+        </p:nvSpPr>
+        <p:spPr>
+          <a:xfrm>
+            <a:off x="1332518" y="4554793"/>
+            <a:ext cx="6096982" cy="369332"/>
+          </a:xfrm>
+          <a:prstGeom prst="rect">
+            <a:avLst/>
+          </a:prstGeom>
+          <a:noFill/>
+        </p:spPr>
+        <p:txBody>
+          <a:bodyPr wrap="square">
+            <a:spAutoFit/>
+          </a:bodyPr>
+          <a:lstStyle/>
+          <a:p>
+            <a:r>
+              <a:rPr lang="en-US" dirty="0">
+                <a:solidFill>
+                  <a:schemeClr val="bg1"/>
+                </a:solidFill>
+              </a:rPr>
+              <a:t>https://github.com/hglanz/mc2_series_2021_GlanzDS</a:t>
             </a:r>
           </a:p>
         </p:txBody>

</xml_diff>